<commit_message>
nu ook Geklikt methode werkend voor ellips
</commit_message>
<xml_diff>
--- a/SchetsPlus/Resources/schets.pptx
+++ b/SchetsPlus/Resources/schets.pptx
@@ -3320,6 +3320,151 @@
       </p:grpSpPr>
       <p:sp>
         <p:nvSpPr>
+          <p:cNvPr id="74" name="Line 12"/>
+          <p:cNvSpPr>
+            <a:spLocks noChangeShapeType="1"/>
+          </p:cNvSpPr>
+          <p:nvPr/>
+        </p:nvSpPr>
+        <p:spPr bwMode="auto">
+          <a:xfrm>
+            <a:off x="7497875" y="4758714"/>
+            <a:ext cx="0" cy="304800"/>
+          </a:xfrm>
+          <a:prstGeom prst="line">
+            <a:avLst/>
+          </a:prstGeom>
+          <a:ln w="25400">
+            <a:headEnd/>
+            <a:tailEnd/>
+          </a:ln>
+        </p:spPr>
+        <p:style>
+          <a:lnRef idx="3">
+            <a:schemeClr val="accent4"/>
+          </a:lnRef>
+          <a:fillRef idx="0">
+            <a:schemeClr val="accent4"/>
+          </a:fillRef>
+          <a:effectRef idx="2">
+            <a:schemeClr val="accent4"/>
+          </a:effectRef>
+          <a:fontRef idx="minor">
+            <a:schemeClr val="tx1"/>
+          </a:fontRef>
+        </p:style>
+        <p:txBody>
+          <a:bodyPr/>
+          <a:lstStyle/>
+          <a:p>
+            <a:endParaRPr lang="en-US"/>
+          </a:p>
+        </p:txBody>
+      </p:sp>
+      <p:sp>
+        <p:nvSpPr>
+          <p:cNvPr id="172" name="Line 18"/>
+          <p:cNvSpPr>
+            <a:spLocks noChangeShapeType="1"/>
+          </p:cNvSpPr>
+          <p:nvPr/>
+        </p:nvSpPr>
+        <p:spPr bwMode="auto">
+          <a:xfrm>
+            <a:off x="4588740" y="3384077"/>
+            <a:ext cx="152400" cy="0"/>
+          </a:xfrm>
+          <a:prstGeom prst="line">
+            <a:avLst/>
+          </a:prstGeom>
+          <a:noFill/>
+          <a:ln w="25400">
+            <a:solidFill>
+              <a:schemeClr val="tx1"/>
+            </a:solidFill>
+            <a:round/>
+            <a:headEnd/>
+            <a:tailEnd/>
+          </a:ln>
+          <a:effectLst/>
+          <a:extLst>
+            <a:ext uri="{909E8E84-426E-40DD-AFC4-6F175D3DCCD1}">
+              <a14:hiddenFill xmlns:a14="http://schemas.microsoft.com/office/drawing/2010/main">
+                <a:noFill/>
+              </a14:hiddenFill>
+            </a:ext>
+            <a:ext uri="{AF507438-7753-43E0-B8FC-AC1667EBCBE1}">
+              <a14:hiddenEffects xmlns:a14="http://schemas.microsoft.com/office/drawing/2010/main">
+                <a:effectLst>
+                  <a:outerShdw dist="35921" dir="2700000" algn="ctr" rotWithShape="0">
+                    <a:schemeClr val="bg2"/>
+                  </a:outerShdw>
+                </a:effectLst>
+              </a14:hiddenEffects>
+            </a:ext>
+          </a:extLst>
+        </p:spPr>
+        <p:txBody>
+          <a:bodyPr/>
+          <a:lstStyle/>
+          <a:p>
+            <a:endParaRPr lang="en-US"/>
+          </a:p>
+        </p:txBody>
+      </p:sp>
+      <p:sp>
+        <p:nvSpPr>
+          <p:cNvPr id="143" name="Line 23"/>
+          <p:cNvSpPr>
+            <a:spLocks noChangeShapeType="1"/>
+          </p:cNvSpPr>
+          <p:nvPr/>
+        </p:nvSpPr>
+        <p:spPr bwMode="auto">
+          <a:xfrm>
+            <a:off x="4588740" y="4252717"/>
+            <a:ext cx="152400" cy="0"/>
+          </a:xfrm>
+          <a:prstGeom prst="line">
+            <a:avLst/>
+          </a:prstGeom>
+          <a:noFill/>
+          <a:ln w="25400">
+            <a:solidFill>
+              <a:schemeClr val="tx1"/>
+            </a:solidFill>
+            <a:round/>
+            <a:headEnd/>
+            <a:tailEnd/>
+          </a:ln>
+          <a:effectLst/>
+          <a:extLst>
+            <a:ext uri="{909E8E84-426E-40DD-AFC4-6F175D3DCCD1}">
+              <a14:hiddenFill xmlns:a14="http://schemas.microsoft.com/office/drawing/2010/main">
+                <a:noFill/>
+              </a14:hiddenFill>
+            </a:ext>
+            <a:ext uri="{AF507438-7753-43E0-B8FC-AC1667EBCBE1}">
+              <a14:hiddenEffects xmlns:a14="http://schemas.microsoft.com/office/drawing/2010/main">
+                <a:effectLst>
+                  <a:outerShdw dist="35921" dir="2700000" algn="ctr" rotWithShape="0">
+                    <a:schemeClr val="bg2"/>
+                  </a:outerShdw>
+                </a:effectLst>
+              </a14:hiddenEffects>
+            </a:ext>
+          </a:extLst>
+        </p:spPr>
+        <p:txBody>
+          <a:bodyPr/>
+          <a:lstStyle/>
+          <a:p>
+            <a:endParaRPr lang="en-US"/>
+          </a:p>
+        </p:txBody>
+      </p:sp>
+      <p:sp>
+        <p:nvSpPr>
           <p:cNvPr id="72" name="Line 12"/>
           <p:cNvSpPr>
             <a:spLocks noChangeShapeType="1"/>
@@ -3328,7 +3473,7 @@
         </p:nvSpPr>
         <p:spPr bwMode="auto">
           <a:xfrm>
-            <a:off x="4446886" y="1372579"/>
+            <a:off x="4357664" y="1314452"/>
             <a:ext cx="215672" cy="2334"/>
           </a:xfrm>
           <a:prstGeom prst="line">
@@ -3504,7 +3649,7 @@
         </p:nvSpPr>
         <p:spPr bwMode="auto">
           <a:xfrm>
-            <a:off x="851222" y="2496527"/>
+            <a:off x="762000" y="2438400"/>
             <a:ext cx="838200" cy="304800"/>
           </a:xfrm>
           <a:prstGeom prst="rect">
@@ -3558,7 +3703,7 @@
         </p:nvSpPr>
         <p:spPr bwMode="auto">
           <a:xfrm>
-            <a:off x="470222" y="2648927"/>
+            <a:off x="381000" y="2590800"/>
             <a:ext cx="381000" cy="0"/>
           </a:xfrm>
           <a:prstGeom prst="line">
@@ -3609,7 +3754,7 @@
         </p:nvSpPr>
         <p:spPr bwMode="auto">
           <a:xfrm>
-            <a:off x="698822" y="2648927"/>
+            <a:off x="609600" y="2590800"/>
             <a:ext cx="0" cy="990600"/>
           </a:xfrm>
           <a:prstGeom prst="line">
@@ -3660,7 +3805,7 @@
         </p:nvSpPr>
         <p:spPr bwMode="auto">
           <a:xfrm>
-            <a:off x="851222" y="3487127"/>
+            <a:off x="762000" y="3429000"/>
             <a:ext cx="838200" cy="304800"/>
           </a:xfrm>
           <a:prstGeom prst="rect">
@@ -3714,7 +3859,7 @@
         </p:nvSpPr>
         <p:spPr bwMode="auto">
           <a:xfrm>
-            <a:off x="698822" y="3639527"/>
+            <a:off x="609600" y="3581400"/>
             <a:ext cx="152400" cy="0"/>
           </a:xfrm>
           <a:prstGeom prst="line">
@@ -3765,7 +3910,7 @@
         </p:nvSpPr>
         <p:spPr bwMode="auto">
           <a:xfrm>
-            <a:off x="2375222" y="2496527"/>
+            <a:off x="2286000" y="2438400"/>
             <a:ext cx="838200" cy="304800"/>
           </a:xfrm>
           <a:prstGeom prst="rect">
@@ -3819,7 +3964,7 @@
         </p:nvSpPr>
         <p:spPr bwMode="auto">
           <a:xfrm>
-            <a:off x="2375222" y="2953727"/>
+            <a:off x="2286000" y="2895600"/>
             <a:ext cx="838200" cy="304800"/>
           </a:xfrm>
           <a:prstGeom prst="rect">
@@ -3873,7 +4018,7 @@
         </p:nvSpPr>
         <p:spPr bwMode="auto">
           <a:xfrm>
-            <a:off x="1689422" y="2648927"/>
+            <a:off x="1600200" y="2590800"/>
             <a:ext cx="685800" cy="0"/>
           </a:xfrm>
           <a:prstGeom prst="line">
@@ -3924,7 +4069,7 @@
         </p:nvSpPr>
         <p:spPr bwMode="auto">
           <a:xfrm>
-            <a:off x="1994222" y="3106127"/>
+            <a:off x="1905000" y="3048000"/>
             <a:ext cx="381000" cy="0"/>
           </a:xfrm>
           <a:prstGeom prst="line">
@@ -3975,7 +4120,7 @@
         </p:nvSpPr>
         <p:spPr bwMode="auto">
           <a:xfrm>
-            <a:off x="1994222" y="2648927"/>
+            <a:off x="1905000" y="2590800"/>
             <a:ext cx="0" cy="457200"/>
           </a:xfrm>
           <a:prstGeom prst="line">
@@ -4026,7 +4171,7 @@
         </p:nvSpPr>
         <p:spPr bwMode="auto">
           <a:xfrm>
-            <a:off x="2375222" y="3487127"/>
+            <a:off x="2286000" y="3429000"/>
             <a:ext cx="838200" cy="304800"/>
           </a:xfrm>
           <a:prstGeom prst="rect">
@@ -4080,7 +4225,7 @@
         </p:nvSpPr>
         <p:spPr bwMode="auto">
           <a:xfrm>
-            <a:off x="1689422" y="3639527"/>
+            <a:off x="1600200" y="3581400"/>
             <a:ext cx="685800" cy="0"/>
           </a:xfrm>
           <a:prstGeom prst="line">
@@ -4131,7 +4276,7 @@
         </p:nvSpPr>
         <p:spPr bwMode="auto">
           <a:xfrm>
-            <a:off x="2375222" y="4020527"/>
+            <a:off x="2286000" y="3962400"/>
             <a:ext cx="838200" cy="304800"/>
           </a:xfrm>
           <a:prstGeom prst="rect">
@@ -4167,11 +4312,14 @@
           <a:p>
             <a:pPr algn="ctr"/>
             <a:r>
-              <a:rPr lang="en-US" altLang="en-US" sz="1000">
+              <a:rPr lang="en-US" altLang="en-US" sz="1000" dirty="0" err="1">
                 <a:latin typeface="Tahoma" panose="020B0604030504040204" pitchFamily="34" charset="0"/>
               </a:rPr>
               <a:t>Schets</a:t>
             </a:r>
+            <a:endParaRPr lang="en-US" altLang="en-US" sz="1000" dirty="0">
+              <a:latin typeface="Tahoma" panose="020B0604030504040204" pitchFamily="34" charset="0"/>
+            </a:endParaRPr>
           </a:p>
         </p:txBody>
       </p:sp>
@@ -4185,8 +4333,8 @@
         </p:nvSpPr>
         <p:spPr bwMode="auto">
           <a:xfrm>
-            <a:off x="2175197" y="896327"/>
-            <a:ext cx="6553200" cy="4572000"/>
+            <a:off x="2085975" y="838200"/>
+            <a:ext cx="6816404" cy="4572000"/>
           </a:xfrm>
           <a:prstGeom prst="roundRect">
             <a:avLst>
@@ -4241,7 +4389,7 @@
         </p:nvSpPr>
         <p:spPr bwMode="auto">
           <a:xfrm>
-            <a:off x="394022" y="2191727"/>
+            <a:off x="304800" y="2133600"/>
             <a:ext cx="1447800" cy="1752600"/>
           </a:xfrm>
           <a:prstGeom prst="roundRect">
@@ -4297,7 +4445,7 @@
         </p:nvSpPr>
         <p:spPr bwMode="auto">
           <a:xfrm>
-            <a:off x="422597" y="2280558"/>
+            <a:off x="333375" y="2222431"/>
             <a:ext cx="1524000" cy="152400"/>
           </a:xfrm>
           <a:prstGeom prst="rect">
@@ -4370,7 +4518,7 @@
         </p:nvSpPr>
         <p:spPr bwMode="auto">
           <a:xfrm>
-            <a:off x="2375222" y="1582127"/>
+            <a:off x="2286000" y="1524000"/>
             <a:ext cx="838200" cy="304800"/>
           </a:xfrm>
           <a:prstGeom prst="rect">
@@ -4424,7 +4572,7 @@
         </p:nvSpPr>
         <p:spPr bwMode="auto">
           <a:xfrm>
-            <a:off x="3532486" y="1245060"/>
+            <a:off x="3443264" y="1186933"/>
             <a:ext cx="914400" cy="304800"/>
           </a:xfrm>
           <a:prstGeom prst="roundRect">
@@ -4612,7 +4760,7 @@
         </p:nvSpPr>
         <p:spPr bwMode="auto">
           <a:xfrm>
-            <a:off x="3989686" y="1549860"/>
+            <a:off x="3900464" y="1491733"/>
             <a:ext cx="0" cy="304800"/>
           </a:xfrm>
           <a:prstGeom prst="line">
@@ -4788,7 +4936,7 @@
         </p:nvSpPr>
         <p:spPr bwMode="auto">
           <a:xfrm>
-            <a:off x="4374671" y="2007060"/>
+            <a:off x="4285449" y="1948933"/>
             <a:ext cx="314325" cy="0"/>
           </a:xfrm>
           <a:prstGeom prst="line">
@@ -4839,7 +4987,7 @@
         </p:nvSpPr>
         <p:spPr bwMode="auto">
           <a:xfrm>
-            <a:off x="3536471" y="1854660"/>
+            <a:off x="3447249" y="1796533"/>
             <a:ext cx="914400" cy="304800"/>
           </a:xfrm>
           <a:prstGeom prst="parallelogram">
@@ -4899,7 +5047,7 @@
         </p:nvSpPr>
         <p:spPr bwMode="auto">
           <a:xfrm>
-            <a:off x="3993671" y="2159460"/>
+            <a:off x="3904449" y="2101333"/>
             <a:ext cx="0" cy="304800"/>
           </a:xfrm>
           <a:prstGeom prst="line">
@@ -4942,7 +5090,7 @@
         </p:nvSpPr>
         <p:spPr bwMode="auto">
           <a:xfrm>
-            <a:off x="4381210" y="2514600"/>
+            <a:off x="4291988" y="2456473"/>
             <a:ext cx="304800" cy="0"/>
           </a:xfrm>
           <a:prstGeom prst="line">
@@ -4993,7 +5141,7 @@
         </p:nvSpPr>
         <p:spPr bwMode="auto">
           <a:xfrm>
-            <a:off x="4503672" y="2514600"/>
+            <a:off x="4414450" y="2456473"/>
             <a:ext cx="0" cy="457200"/>
           </a:xfrm>
           <a:prstGeom prst="line">
@@ -5044,7 +5192,7 @@
         </p:nvSpPr>
         <p:spPr bwMode="auto">
           <a:xfrm>
-            <a:off x="3539025" y="2356758"/>
+            <a:off x="3449803" y="2298631"/>
             <a:ext cx="914400" cy="304800"/>
           </a:xfrm>
           <a:prstGeom prst="parallelogram">
@@ -5104,7 +5252,7 @@
         </p:nvSpPr>
         <p:spPr bwMode="auto">
           <a:xfrm>
-            <a:off x="4592897" y="2362200"/>
+            <a:off x="4503675" y="2304073"/>
             <a:ext cx="838200" cy="304800"/>
           </a:xfrm>
           <a:prstGeom prst="rect">
@@ -5169,7 +5317,7 @@
         </p:nvSpPr>
         <p:spPr bwMode="auto">
           <a:xfrm>
-            <a:off x="4822982" y="3274644"/>
+            <a:off x="4733760" y="3216517"/>
             <a:ext cx="940256" cy="304800"/>
           </a:xfrm>
           <a:prstGeom prst="rect">
@@ -5223,7 +5371,7 @@
         </p:nvSpPr>
         <p:spPr bwMode="auto">
           <a:xfrm>
-            <a:off x="4595883" y="1854660"/>
+            <a:off x="4506661" y="1796533"/>
             <a:ext cx="828675" cy="304800"/>
           </a:xfrm>
           <a:prstGeom prst="rect">
@@ -5277,7 +5425,7 @@
         </p:nvSpPr>
         <p:spPr bwMode="auto">
           <a:xfrm>
-            <a:off x="4586358" y="1220179"/>
+            <a:off x="4497136" y="1162052"/>
             <a:ext cx="838200" cy="304800"/>
           </a:xfrm>
           <a:prstGeom prst="rect">
@@ -5334,7 +5482,7 @@
         </p:nvSpPr>
         <p:spPr bwMode="auto">
           <a:xfrm>
-            <a:off x="4831168" y="3711735"/>
+            <a:off x="4741946" y="3653608"/>
             <a:ext cx="940256" cy="304800"/>
           </a:xfrm>
           <a:prstGeom prst="rect">
@@ -5391,7 +5539,7 @@
         </p:nvSpPr>
         <p:spPr bwMode="auto">
           <a:xfrm>
-            <a:off x="4820859" y="4159409"/>
+            <a:off x="4731637" y="4101282"/>
             <a:ext cx="940256" cy="304800"/>
           </a:xfrm>
           <a:prstGeom prst="rect">
@@ -5465,7 +5613,7 @@
         </p:nvSpPr>
         <p:spPr bwMode="auto">
           <a:xfrm>
-            <a:off x="4527809" y="2819400"/>
+            <a:off x="4438587" y="2761273"/>
             <a:ext cx="922338" cy="304800"/>
           </a:xfrm>
           <a:prstGeom prst="parallelogram">
@@ -5538,7 +5686,7 @@
         </p:nvSpPr>
         <p:spPr bwMode="auto">
           <a:xfrm>
-            <a:off x="4503671" y="2971800"/>
+            <a:off x="4414449" y="2913673"/>
             <a:ext cx="89225" cy="0"/>
           </a:xfrm>
           <a:prstGeom prst="line">
@@ -5589,7 +5737,7 @@
         </p:nvSpPr>
         <p:spPr bwMode="auto">
           <a:xfrm>
-            <a:off x="4669097" y="3124199"/>
+            <a:off x="4579875" y="3066072"/>
             <a:ext cx="15076" cy="1997442"/>
           </a:xfrm>
           <a:prstGeom prst="line">
@@ -5640,7 +5788,7 @@
         </p:nvSpPr>
         <p:spPr bwMode="auto">
           <a:xfrm>
-            <a:off x="4678768" y="3864135"/>
+            <a:off x="4589546" y="3806008"/>
             <a:ext cx="152400" cy="0"/>
           </a:xfrm>
           <a:prstGeom prst="line">
@@ -5683,66 +5831,15 @@
       </p:sp>
       <p:sp>
         <p:nvSpPr>
-          <p:cNvPr id="143" name="Line 23"/>
-          <p:cNvSpPr>
-            <a:spLocks noChangeShapeType="1"/>
+          <p:cNvPr id="144" name="Rectangle 9"/>
+          <p:cNvSpPr>
+            <a:spLocks noChangeArrowheads="1"/>
           </p:cNvSpPr>
           <p:nvPr/>
         </p:nvSpPr>
         <p:spPr bwMode="auto">
           <a:xfrm>
-            <a:off x="4669097" y="4219768"/>
-            <a:ext cx="152400" cy="0"/>
-          </a:xfrm>
-          <a:prstGeom prst="line">
-            <a:avLst/>
-          </a:prstGeom>
-          <a:noFill/>
-          <a:ln w="25400">
-            <a:solidFill>
-              <a:schemeClr val="tx1"/>
-            </a:solidFill>
-            <a:round/>
-            <a:headEnd/>
-            <a:tailEnd/>
-          </a:ln>
-          <a:effectLst/>
-          <a:extLst>
-            <a:ext uri="{909E8E84-426E-40DD-AFC4-6F175D3DCCD1}">
-              <a14:hiddenFill xmlns:a14="http://schemas.microsoft.com/office/drawing/2010/main">
-                <a:noFill/>
-              </a14:hiddenFill>
-            </a:ext>
-            <a:ext uri="{AF507438-7753-43E0-B8FC-AC1667EBCBE1}">
-              <a14:hiddenEffects xmlns:a14="http://schemas.microsoft.com/office/drawing/2010/main">
-                <a:effectLst>
-                  <a:outerShdw dist="35921" dir="2700000" algn="ctr" rotWithShape="0">
-                    <a:schemeClr val="bg2"/>
-                  </a:outerShdw>
-                </a:effectLst>
-              </a14:hiddenEffects>
-            </a:ext>
-          </a:extLst>
-        </p:spPr>
-        <p:txBody>
-          <a:bodyPr/>
-          <a:lstStyle/>
-          <a:p>
-            <a:endParaRPr lang="en-US"/>
-          </a:p>
-        </p:txBody>
-      </p:sp>
-      <p:sp>
-        <p:nvSpPr>
-          <p:cNvPr id="144" name="Rectangle 9"/>
-          <p:cNvSpPr>
-            <a:spLocks noChangeArrowheads="1"/>
-          </p:cNvSpPr>
-          <p:nvPr/>
-        </p:nvSpPr>
-        <p:spPr bwMode="auto">
-          <a:xfrm>
-            <a:off x="4823246" y="4572976"/>
+            <a:off x="4734024" y="4514849"/>
             <a:ext cx="940256" cy="304800"/>
           </a:xfrm>
           <a:prstGeom prst="rect">
@@ -5799,7 +5896,7 @@
         </p:nvSpPr>
         <p:spPr bwMode="auto">
           <a:xfrm>
-            <a:off x="4670846" y="4725376"/>
+            <a:off x="4581624" y="4667249"/>
             <a:ext cx="152400" cy="0"/>
           </a:xfrm>
           <a:prstGeom prst="line">
@@ -5850,7 +5947,7 @@
         </p:nvSpPr>
         <p:spPr bwMode="auto">
           <a:xfrm>
-            <a:off x="4820859" y="4969241"/>
+            <a:off x="4731637" y="4911114"/>
             <a:ext cx="940256" cy="304800"/>
           </a:xfrm>
           <a:prstGeom prst="rect">
@@ -5907,7 +6004,7 @@
         </p:nvSpPr>
         <p:spPr bwMode="auto">
           <a:xfrm>
-            <a:off x="4668459" y="5121641"/>
+            <a:off x="4579237" y="5063514"/>
             <a:ext cx="152400" cy="0"/>
           </a:xfrm>
           <a:prstGeom prst="line">
@@ -5958,7 +6055,7 @@
         </p:nvSpPr>
         <p:spPr bwMode="auto">
           <a:xfrm>
-            <a:off x="7047012" y="2006283"/>
+            <a:off x="6957790" y="1948156"/>
             <a:ext cx="314325" cy="0"/>
           </a:xfrm>
           <a:prstGeom prst="line">
@@ -6009,7 +6106,7 @@
         </p:nvSpPr>
         <p:spPr bwMode="auto">
           <a:xfrm>
-            <a:off x="5989723" y="1853883"/>
+            <a:off x="5900501" y="1795756"/>
             <a:ext cx="1133489" cy="304800"/>
           </a:xfrm>
           <a:prstGeom prst="parallelogram">
@@ -6069,7 +6166,7 @@
         </p:nvSpPr>
         <p:spPr bwMode="auto">
           <a:xfrm>
-            <a:off x="6666012" y="2158683"/>
+            <a:off x="6576790" y="2100556"/>
             <a:ext cx="0" cy="304800"/>
           </a:xfrm>
           <a:prstGeom prst="line">
@@ -6112,7 +6209,7 @@
         </p:nvSpPr>
         <p:spPr bwMode="auto">
           <a:xfrm>
-            <a:off x="7027313" y="2514600"/>
+            <a:off x="6938091" y="2456473"/>
             <a:ext cx="304800" cy="0"/>
           </a:xfrm>
           <a:prstGeom prst="line">
@@ -6163,7 +6260,7 @@
         </p:nvSpPr>
         <p:spPr bwMode="auto">
           <a:xfrm>
-            <a:off x="7149775" y="2514600"/>
+            <a:off x="7060553" y="2456473"/>
             <a:ext cx="0" cy="457200"/>
           </a:xfrm>
           <a:prstGeom prst="line">
@@ -6214,7 +6311,7 @@
         </p:nvSpPr>
         <p:spPr bwMode="auto">
           <a:xfrm flipV="1">
-            <a:off x="7315200" y="3427446"/>
+            <a:off x="7225978" y="3369319"/>
             <a:ext cx="197012" cy="1553"/>
           </a:xfrm>
           <a:prstGeom prst="line">
@@ -6265,7 +6362,7 @@
         </p:nvSpPr>
         <p:spPr bwMode="auto">
           <a:xfrm>
-            <a:off x="5966039" y="2356758"/>
+            <a:off x="5876817" y="2298631"/>
             <a:ext cx="1133489" cy="304800"/>
           </a:xfrm>
           <a:prstGeom prst="parallelogram">
@@ -6325,7 +6422,7 @@
         </p:nvSpPr>
         <p:spPr bwMode="auto">
           <a:xfrm>
-            <a:off x="7239000" y="2362200"/>
+            <a:off x="7149778" y="2304073"/>
             <a:ext cx="838200" cy="304800"/>
           </a:xfrm>
           <a:prstGeom prst="rect">
@@ -6382,7 +6479,7 @@
         </p:nvSpPr>
         <p:spPr bwMode="auto">
           <a:xfrm>
-            <a:off x="7467600" y="3276600"/>
+            <a:off x="7378378" y="3218473"/>
             <a:ext cx="1102960" cy="304800"/>
           </a:xfrm>
           <a:prstGeom prst="rect">
@@ -6439,7 +6536,7 @@
         </p:nvSpPr>
         <p:spPr bwMode="auto">
           <a:xfrm>
-            <a:off x="7268224" y="1853883"/>
+            <a:off x="7179002" y="1795756"/>
             <a:ext cx="828675" cy="304800"/>
           </a:xfrm>
           <a:prstGeom prst="rect">
@@ -6496,7 +6593,7 @@
         </p:nvSpPr>
         <p:spPr bwMode="auto">
           <a:xfrm>
-            <a:off x="7465629" y="3709022"/>
+            <a:off x="7376407" y="3650895"/>
             <a:ext cx="1102960" cy="304800"/>
           </a:xfrm>
           <a:prstGeom prst="rect">
@@ -6553,7 +6650,7 @@
         </p:nvSpPr>
         <p:spPr bwMode="auto">
           <a:xfrm>
-            <a:off x="7474753" y="4158444"/>
+            <a:off x="7385531" y="4100317"/>
             <a:ext cx="1102960" cy="304800"/>
           </a:xfrm>
           <a:prstGeom prst="rect">
@@ -6627,7 +6724,7 @@
         </p:nvSpPr>
         <p:spPr bwMode="auto">
           <a:xfrm>
-            <a:off x="7162800" y="2819400"/>
+            <a:off x="7073578" y="2761273"/>
             <a:ext cx="922338" cy="304800"/>
           </a:xfrm>
           <a:prstGeom prst="parallelogram">
@@ -6703,7 +6800,7 @@
         </p:nvSpPr>
         <p:spPr bwMode="auto">
           <a:xfrm>
-            <a:off x="7149774" y="2971800"/>
+            <a:off x="7060552" y="2913673"/>
             <a:ext cx="89225" cy="0"/>
           </a:xfrm>
           <a:prstGeom prst="line">
@@ -6754,8 +6851,8 @@
         </p:nvSpPr>
         <p:spPr bwMode="auto">
           <a:xfrm>
-            <a:off x="7315199" y="3124198"/>
-            <a:ext cx="5406" cy="2004725"/>
+            <a:off x="7225976" y="3066072"/>
+            <a:ext cx="11311" cy="1636068"/>
           </a:xfrm>
           <a:prstGeom prst="line">
             <a:avLst/>
@@ -6805,7 +6902,7 @@
         </p:nvSpPr>
         <p:spPr bwMode="auto">
           <a:xfrm>
-            <a:off x="7313229" y="3859862"/>
+            <a:off x="7224007" y="3801735"/>
             <a:ext cx="152400" cy="0"/>
           </a:xfrm>
           <a:prstGeom prst="line">
@@ -6856,7 +6953,7 @@
         </p:nvSpPr>
         <p:spPr bwMode="auto">
           <a:xfrm>
-            <a:off x="7322353" y="4310844"/>
+            <a:off x="7233131" y="4252717"/>
             <a:ext cx="152400" cy="0"/>
           </a:xfrm>
           <a:prstGeom prst="line">
@@ -6907,7 +7004,7 @@
         </p:nvSpPr>
         <p:spPr bwMode="auto">
           <a:xfrm>
-            <a:off x="7482805" y="4970590"/>
+            <a:off x="7383782" y="4549739"/>
             <a:ext cx="1102960" cy="304800"/>
           </a:xfrm>
           <a:prstGeom prst="rect">
@@ -6964,7 +7061,7 @@
         </p:nvSpPr>
         <p:spPr bwMode="auto">
           <a:xfrm>
-            <a:off x="7328657" y="5122990"/>
+            <a:off x="7229634" y="4702139"/>
             <a:ext cx="152400" cy="0"/>
           </a:xfrm>
           <a:prstGeom prst="line">
@@ -7007,7 +7104,338 @@
       </p:sp>
       <p:sp>
         <p:nvSpPr>
-          <p:cNvPr id="168" name="Line 18"/>
+          <p:cNvPr id="170" name="AutoShape 53"/>
+          <p:cNvSpPr>
+            <a:spLocks noChangeArrowheads="1"/>
+          </p:cNvSpPr>
+          <p:nvPr/>
+        </p:nvSpPr>
+        <p:spPr bwMode="auto">
+          <a:xfrm>
+            <a:off x="5811012" y="914400"/>
+            <a:ext cx="3015166" cy="4384997"/>
+          </a:xfrm>
+          <a:prstGeom prst="roundRect">
+            <a:avLst>
+              <a:gd name="adj" fmla="val 4167"/>
+            </a:avLst>
+          </a:prstGeom>
+          <a:noFill/>
+          <a:ln w="9525" cap="rnd">
+            <a:solidFill>
+              <a:schemeClr val="tx1"/>
+            </a:solidFill>
+            <a:prstDash val="sysDot"/>
+            <a:round/>
+            <a:headEnd/>
+            <a:tailEnd/>
+          </a:ln>
+          <a:effectLst/>
+          <a:extLst>
+            <a:ext uri="{909E8E84-426E-40DD-AFC4-6F175D3DCCD1}">
+              <a14:hiddenFill xmlns:a14="http://schemas.microsoft.com/office/drawing/2010/main">
+                <a:solidFill>
+                  <a:schemeClr val="accent1"/>
+                </a:solidFill>
+              </a14:hiddenFill>
+            </a:ext>
+            <a:ext uri="{AF507438-7753-43E0-B8FC-AC1667EBCBE1}">
+              <a14:hiddenEffects xmlns:a14="http://schemas.microsoft.com/office/drawing/2010/main">
+                <a:effectLst>
+                  <a:outerShdw dist="35921" dir="2700000" algn="ctr" rotWithShape="0">
+                    <a:schemeClr val="bg2"/>
+                  </a:outerShdw>
+                </a:effectLst>
+              </a14:hiddenEffects>
+            </a:ext>
+          </a:extLst>
+        </p:spPr>
+        <p:txBody>
+          <a:bodyPr wrap="none" anchor="ctr"/>
+          <a:lstStyle/>
+          <a:p>
+            <a:endParaRPr lang="en-US"/>
+          </a:p>
+        </p:txBody>
+      </p:sp>
+      <p:sp>
+        <p:nvSpPr>
+          <p:cNvPr id="171" name="AutoShape 53"/>
+          <p:cNvSpPr>
+            <a:spLocks noChangeArrowheads="1"/>
+          </p:cNvSpPr>
+          <p:nvPr/>
+        </p:nvSpPr>
+        <p:spPr bwMode="auto">
+          <a:xfrm>
+            <a:off x="3383170" y="914400"/>
+            <a:ext cx="2388754" cy="4384997"/>
+          </a:xfrm>
+          <a:prstGeom prst="roundRect">
+            <a:avLst>
+              <a:gd name="adj" fmla="val 4167"/>
+            </a:avLst>
+          </a:prstGeom>
+          <a:noFill/>
+          <a:ln w="9525" cap="rnd">
+            <a:solidFill>
+              <a:schemeClr val="tx1"/>
+            </a:solidFill>
+            <a:prstDash val="sysDot"/>
+            <a:round/>
+            <a:headEnd/>
+            <a:tailEnd/>
+          </a:ln>
+          <a:effectLst/>
+          <a:extLst>
+            <a:ext uri="{909E8E84-426E-40DD-AFC4-6F175D3DCCD1}">
+              <a14:hiddenFill xmlns:a14="http://schemas.microsoft.com/office/drawing/2010/main">
+                <a:solidFill>
+                  <a:schemeClr val="accent1"/>
+                </a:solidFill>
+              </a14:hiddenFill>
+            </a:ext>
+            <a:ext uri="{AF507438-7753-43E0-B8FC-AC1667EBCBE1}">
+              <a14:hiddenEffects xmlns:a14="http://schemas.microsoft.com/office/drawing/2010/main">
+                <a:effectLst>
+                  <a:outerShdw dist="35921" dir="2700000" algn="ctr" rotWithShape="0">
+                    <a:schemeClr val="bg2"/>
+                  </a:outerShdw>
+                </a:effectLst>
+              </a14:hiddenEffects>
+            </a:ext>
+          </a:extLst>
+        </p:spPr>
+        <p:txBody>
+          <a:bodyPr wrap="none" anchor="ctr"/>
+          <a:lstStyle/>
+          <a:p>
+            <a:endParaRPr lang="en-US"/>
+          </a:p>
+        </p:txBody>
+      </p:sp>
+      <p:sp>
+        <p:nvSpPr>
+          <p:cNvPr id="173" name="Text Box 56"/>
+          <p:cNvSpPr txBox="1">
+            <a:spLocks noChangeArrowheads="1"/>
+          </p:cNvSpPr>
+          <p:nvPr/>
+        </p:nvSpPr>
+        <p:spPr bwMode="auto">
+          <a:xfrm>
+            <a:off x="3469118" y="963776"/>
+            <a:ext cx="1524000" cy="152400"/>
+          </a:xfrm>
+          <a:prstGeom prst="rect">
+            <a:avLst/>
+          </a:prstGeom>
+          <a:noFill/>
+          <a:ln>
+            <a:noFill/>
+          </a:ln>
+          <a:effectLst/>
+          <a:extLst>
+            <a:ext uri="{909E8E84-426E-40DD-AFC4-6F175D3DCCD1}">
+              <a14:hiddenFill xmlns:a14="http://schemas.microsoft.com/office/drawing/2010/main">
+                <a:solidFill>
+                  <a:schemeClr val="accent1"/>
+                </a:solidFill>
+              </a14:hiddenFill>
+            </a:ext>
+            <a:ext uri="{91240B29-F687-4F45-9708-019B960494DF}">
+              <a14:hiddenLine xmlns:a14="http://schemas.microsoft.com/office/drawing/2010/main" w="9525">
+                <a:solidFill>
+                  <a:schemeClr val="tx1"/>
+                </a:solidFill>
+                <a:miter lim="800000"/>
+                <a:headEnd/>
+                <a:tailEnd/>
+              </a14:hiddenLine>
+            </a:ext>
+            <a:ext uri="{AF507438-7753-43E0-B8FC-AC1667EBCBE1}">
+              <a14:hiddenEffects xmlns:a14="http://schemas.microsoft.com/office/drawing/2010/main">
+                <a:effectLst>
+                  <a:outerShdw dist="35921" dir="2700000" algn="ctr" rotWithShape="0">
+                    <a:schemeClr val="bg2"/>
+                  </a:outerShdw>
+                </a:effectLst>
+              </a14:hiddenEffects>
+            </a:ext>
+          </a:extLst>
+        </p:spPr>
+        <p:txBody>
+          <a:bodyPr lIns="0" tIns="0" rIns="0" bIns="0">
+            <a:spAutoFit/>
+          </a:bodyPr>
+          <a:lstStyle/>
+          <a:p>
+            <a:pPr>
+              <a:spcBef>
+                <a:spcPct val="50000"/>
+              </a:spcBef>
+            </a:pPr>
+            <a:r>
+              <a:rPr lang="en-US" altLang="en-US" sz="1000" i="1" dirty="0" smtClean="0">
+                <a:latin typeface="Tahoma" panose="020B0604030504040204" pitchFamily="34" charset="0"/>
+              </a:rPr>
+              <a:t>Tools</a:t>
+            </a:r>
+            <a:endParaRPr lang="en-US" altLang="en-US" sz="1000" i="1" dirty="0">
+              <a:latin typeface="Tahoma" panose="020B0604030504040204" pitchFamily="34" charset="0"/>
+            </a:endParaRPr>
+          </a:p>
+        </p:txBody>
+      </p:sp>
+      <p:sp>
+        <p:nvSpPr>
+          <p:cNvPr id="174" name="Text Box 56"/>
+          <p:cNvSpPr txBox="1">
+            <a:spLocks noChangeArrowheads="1"/>
+          </p:cNvSpPr>
+          <p:nvPr/>
+        </p:nvSpPr>
+        <p:spPr bwMode="auto">
+          <a:xfrm>
+            <a:off x="5900501" y="982638"/>
+            <a:ext cx="1524000" cy="152400"/>
+          </a:xfrm>
+          <a:prstGeom prst="rect">
+            <a:avLst/>
+          </a:prstGeom>
+          <a:noFill/>
+          <a:ln>
+            <a:noFill/>
+          </a:ln>
+          <a:effectLst/>
+          <a:extLst>
+            <a:ext uri="{909E8E84-426E-40DD-AFC4-6F175D3DCCD1}">
+              <a14:hiddenFill xmlns:a14="http://schemas.microsoft.com/office/drawing/2010/main">
+                <a:solidFill>
+                  <a:schemeClr val="accent1"/>
+                </a:solidFill>
+              </a14:hiddenFill>
+            </a:ext>
+            <a:ext uri="{91240B29-F687-4F45-9708-019B960494DF}">
+              <a14:hiddenLine xmlns:a14="http://schemas.microsoft.com/office/drawing/2010/main" w="9525">
+                <a:solidFill>
+                  <a:schemeClr val="tx1"/>
+                </a:solidFill>
+                <a:miter lim="800000"/>
+                <a:headEnd/>
+                <a:tailEnd/>
+              </a14:hiddenLine>
+            </a:ext>
+            <a:ext uri="{AF507438-7753-43E0-B8FC-AC1667EBCBE1}">
+              <a14:hiddenEffects xmlns:a14="http://schemas.microsoft.com/office/drawing/2010/main">
+                <a:effectLst>
+                  <a:outerShdw dist="35921" dir="2700000" algn="ctr" rotWithShape="0">
+                    <a:schemeClr val="bg2"/>
+                  </a:outerShdw>
+                </a:effectLst>
+              </a14:hiddenEffects>
+            </a:ext>
+          </a:extLst>
+        </p:spPr>
+        <p:txBody>
+          <a:bodyPr lIns="0" tIns="0" rIns="0" bIns="0">
+            <a:spAutoFit/>
+          </a:bodyPr>
+          <a:lstStyle/>
+          <a:p>
+            <a:pPr>
+              <a:spcBef>
+                <a:spcPct val="50000"/>
+              </a:spcBef>
+            </a:pPr>
+            <a:r>
+              <a:rPr lang="en-US" altLang="en-US" sz="1000" i="1" dirty="0" err="1" smtClean="0">
+                <a:latin typeface="Tahoma" panose="020B0604030504040204" pitchFamily="34" charset="0"/>
+              </a:rPr>
+              <a:t>Objecten</a:t>
+            </a:r>
+            <a:endParaRPr lang="en-US" altLang="en-US" sz="1000" i="1" dirty="0">
+              <a:latin typeface="Tahoma" panose="020B0604030504040204" pitchFamily="34" charset="0"/>
+            </a:endParaRPr>
+          </a:p>
+        </p:txBody>
+      </p:sp>
+      <p:sp>
+        <p:nvSpPr>
+          <p:cNvPr id="71" name="Text Box 56"/>
+          <p:cNvSpPr txBox="1">
+            <a:spLocks noChangeArrowheads="1"/>
+          </p:cNvSpPr>
+          <p:nvPr/>
+        </p:nvSpPr>
+        <p:spPr bwMode="auto">
+          <a:xfrm>
+            <a:off x="2162175" y="963964"/>
+            <a:ext cx="1181907" cy="153888"/>
+          </a:xfrm>
+          <a:prstGeom prst="rect">
+            <a:avLst/>
+          </a:prstGeom>
+          <a:noFill/>
+          <a:ln>
+            <a:noFill/>
+          </a:ln>
+          <a:effectLst/>
+          <a:extLst>
+            <a:ext uri="{909E8E84-426E-40DD-AFC4-6F175D3DCCD1}">
+              <a14:hiddenFill xmlns:a14="http://schemas.microsoft.com/office/drawing/2010/main">
+                <a:solidFill>
+                  <a:schemeClr val="accent1"/>
+                </a:solidFill>
+              </a14:hiddenFill>
+            </a:ext>
+            <a:ext uri="{91240B29-F687-4F45-9708-019B960494DF}">
+              <a14:hiddenLine xmlns:a14="http://schemas.microsoft.com/office/drawing/2010/main" w="9525">
+                <a:solidFill>
+                  <a:schemeClr val="tx1"/>
+                </a:solidFill>
+                <a:miter lim="800000"/>
+                <a:headEnd/>
+                <a:tailEnd/>
+              </a14:hiddenLine>
+            </a:ext>
+            <a:ext uri="{AF507438-7753-43E0-B8FC-AC1667EBCBE1}">
+              <a14:hiddenEffects xmlns:a14="http://schemas.microsoft.com/office/drawing/2010/main">
+                <a:effectLst>
+                  <a:outerShdw dist="35921" dir="2700000" algn="ctr" rotWithShape="0">
+                    <a:schemeClr val="bg2"/>
+                  </a:outerShdw>
+                </a:effectLst>
+              </a14:hiddenEffects>
+            </a:ext>
+          </a:extLst>
+        </p:spPr>
+        <p:txBody>
+          <a:bodyPr wrap="square" lIns="0" tIns="0" rIns="0" bIns="0">
+            <a:spAutoFit/>
+          </a:bodyPr>
+          <a:lstStyle/>
+          <a:p>
+            <a:pPr>
+              <a:spcBef>
+                <a:spcPct val="50000"/>
+              </a:spcBef>
+            </a:pPr>
+            <a:r>
+              <a:rPr lang="en-US" altLang="en-US" sz="1000" i="1" dirty="0" err="1" smtClean="0">
+                <a:latin typeface="Tahoma" panose="020B0604030504040204" pitchFamily="34" charset="0"/>
+              </a:rPr>
+              <a:t>SchetsPlus</a:t>
+            </a:r>
+            <a:endParaRPr lang="en-US" altLang="en-US" sz="1000" i="1" dirty="0">
+              <a:latin typeface="Tahoma" panose="020B0604030504040204" pitchFamily="34" charset="0"/>
+            </a:endParaRPr>
+          </a:p>
+        </p:txBody>
+      </p:sp>
+      <p:sp>
+        <p:nvSpPr>
+          <p:cNvPr id="70" name="Line 18"/>
           <p:cNvSpPr>
             <a:spLocks noChangeShapeType="1"/>
           </p:cNvSpPr>
@@ -7015,7 +7443,7 @@
         </p:nvSpPr>
         <p:spPr bwMode="auto">
           <a:xfrm>
-            <a:off x="7338022" y="4716043"/>
+            <a:off x="7497875" y="5057575"/>
             <a:ext cx="152400" cy="0"/>
           </a:xfrm>
           <a:prstGeom prst="line">
@@ -7058,7 +7486,7 @@
       </p:sp>
       <p:sp>
         <p:nvSpPr>
-          <p:cNvPr id="169" name="Rectangle 9"/>
+          <p:cNvPr id="73" name="Rectangle 9"/>
           <p:cNvSpPr>
             <a:spLocks noChangeArrowheads="1"/>
           </p:cNvSpPr>
@@ -7066,7 +7494,7 @@
         </p:nvSpPr>
         <p:spPr bwMode="auto">
           <a:xfrm>
-            <a:off x="7474761" y="4572976"/>
+            <a:off x="7634614" y="4914508"/>
             <a:ext cx="1102960" cy="304800"/>
           </a:xfrm>
           <a:prstGeom prst="rect">
@@ -7108,388 +7536,6 @@
               <a:t>EllipsObject</a:t>
             </a:r>
             <a:endParaRPr lang="en-US" altLang="en-US" sz="1000" dirty="0">
-              <a:latin typeface="Tahoma" panose="020B0604030504040204" pitchFamily="34" charset="0"/>
-            </a:endParaRPr>
-          </a:p>
-        </p:txBody>
-      </p:sp>
-      <p:sp>
-        <p:nvSpPr>
-          <p:cNvPr id="170" name="AutoShape 53"/>
-          <p:cNvSpPr>
-            <a:spLocks noChangeArrowheads="1"/>
-          </p:cNvSpPr>
-          <p:nvPr/>
-        </p:nvSpPr>
-        <p:spPr bwMode="auto">
-          <a:xfrm>
-            <a:off x="5900234" y="972527"/>
-            <a:ext cx="2751963" cy="4384997"/>
-          </a:xfrm>
-          <a:prstGeom prst="roundRect">
-            <a:avLst>
-              <a:gd name="adj" fmla="val 4167"/>
-            </a:avLst>
-          </a:prstGeom>
-          <a:noFill/>
-          <a:ln w="9525" cap="rnd">
-            <a:solidFill>
-              <a:schemeClr val="tx1"/>
-            </a:solidFill>
-            <a:prstDash val="sysDot"/>
-            <a:round/>
-            <a:headEnd/>
-            <a:tailEnd/>
-          </a:ln>
-          <a:effectLst/>
-          <a:extLst>
-            <a:ext uri="{909E8E84-426E-40DD-AFC4-6F175D3DCCD1}">
-              <a14:hiddenFill xmlns:a14="http://schemas.microsoft.com/office/drawing/2010/main">
-                <a:solidFill>
-                  <a:schemeClr val="accent1"/>
-                </a:solidFill>
-              </a14:hiddenFill>
-            </a:ext>
-            <a:ext uri="{AF507438-7753-43E0-B8FC-AC1667EBCBE1}">
-              <a14:hiddenEffects xmlns:a14="http://schemas.microsoft.com/office/drawing/2010/main">
-                <a:effectLst>
-                  <a:outerShdw dist="35921" dir="2700000" algn="ctr" rotWithShape="0">
-                    <a:schemeClr val="bg2"/>
-                  </a:outerShdw>
-                </a:effectLst>
-              </a14:hiddenEffects>
-            </a:ext>
-          </a:extLst>
-        </p:spPr>
-        <p:txBody>
-          <a:bodyPr wrap="none" anchor="ctr"/>
-          <a:lstStyle/>
-          <a:p>
-            <a:endParaRPr lang="en-US"/>
-          </a:p>
-        </p:txBody>
-      </p:sp>
-      <p:sp>
-        <p:nvSpPr>
-          <p:cNvPr id="171" name="AutoShape 53"/>
-          <p:cNvSpPr>
-            <a:spLocks noChangeArrowheads="1"/>
-          </p:cNvSpPr>
-          <p:nvPr/>
-        </p:nvSpPr>
-        <p:spPr bwMode="auto">
-          <a:xfrm>
-            <a:off x="3472392" y="972527"/>
-            <a:ext cx="2388754" cy="4384997"/>
-          </a:xfrm>
-          <a:prstGeom prst="roundRect">
-            <a:avLst>
-              <a:gd name="adj" fmla="val 4167"/>
-            </a:avLst>
-          </a:prstGeom>
-          <a:noFill/>
-          <a:ln w="9525" cap="rnd">
-            <a:solidFill>
-              <a:schemeClr val="tx1"/>
-            </a:solidFill>
-            <a:prstDash val="sysDot"/>
-            <a:round/>
-            <a:headEnd/>
-            <a:tailEnd/>
-          </a:ln>
-          <a:effectLst/>
-          <a:extLst>
-            <a:ext uri="{909E8E84-426E-40DD-AFC4-6F175D3DCCD1}">
-              <a14:hiddenFill xmlns:a14="http://schemas.microsoft.com/office/drawing/2010/main">
-                <a:solidFill>
-                  <a:schemeClr val="accent1"/>
-                </a:solidFill>
-              </a14:hiddenFill>
-            </a:ext>
-            <a:ext uri="{AF507438-7753-43E0-B8FC-AC1667EBCBE1}">
-              <a14:hiddenEffects xmlns:a14="http://schemas.microsoft.com/office/drawing/2010/main">
-                <a:effectLst>
-                  <a:outerShdw dist="35921" dir="2700000" algn="ctr" rotWithShape="0">
-                    <a:schemeClr val="bg2"/>
-                  </a:outerShdw>
-                </a:effectLst>
-              </a14:hiddenEffects>
-            </a:ext>
-          </a:extLst>
-        </p:spPr>
-        <p:txBody>
-          <a:bodyPr wrap="none" anchor="ctr"/>
-          <a:lstStyle/>
-          <a:p>
-            <a:endParaRPr lang="en-US"/>
-          </a:p>
-        </p:txBody>
-      </p:sp>
-      <p:sp>
-        <p:nvSpPr>
-          <p:cNvPr id="172" name="Line 18"/>
-          <p:cNvSpPr>
-            <a:spLocks noChangeShapeType="1"/>
-          </p:cNvSpPr>
-          <p:nvPr/>
-        </p:nvSpPr>
-        <p:spPr bwMode="auto">
-          <a:xfrm>
-            <a:off x="4677962" y="3442204"/>
-            <a:ext cx="152400" cy="0"/>
-          </a:xfrm>
-          <a:prstGeom prst="line">
-            <a:avLst/>
-          </a:prstGeom>
-          <a:noFill/>
-          <a:ln w="25400">
-            <a:solidFill>
-              <a:schemeClr val="tx1"/>
-            </a:solidFill>
-            <a:round/>
-            <a:headEnd/>
-            <a:tailEnd/>
-          </a:ln>
-          <a:effectLst/>
-          <a:extLst>
-            <a:ext uri="{909E8E84-426E-40DD-AFC4-6F175D3DCCD1}">
-              <a14:hiddenFill xmlns:a14="http://schemas.microsoft.com/office/drawing/2010/main">
-                <a:noFill/>
-              </a14:hiddenFill>
-            </a:ext>
-            <a:ext uri="{AF507438-7753-43E0-B8FC-AC1667EBCBE1}">
-              <a14:hiddenEffects xmlns:a14="http://schemas.microsoft.com/office/drawing/2010/main">
-                <a:effectLst>
-                  <a:outerShdw dist="35921" dir="2700000" algn="ctr" rotWithShape="0">
-                    <a:schemeClr val="bg2"/>
-                  </a:outerShdw>
-                </a:effectLst>
-              </a14:hiddenEffects>
-            </a:ext>
-          </a:extLst>
-        </p:spPr>
-        <p:txBody>
-          <a:bodyPr/>
-          <a:lstStyle/>
-          <a:p>
-            <a:endParaRPr lang="en-US"/>
-          </a:p>
-        </p:txBody>
-      </p:sp>
-      <p:sp>
-        <p:nvSpPr>
-          <p:cNvPr id="173" name="Text Box 56"/>
-          <p:cNvSpPr txBox="1">
-            <a:spLocks noChangeArrowheads="1"/>
-          </p:cNvSpPr>
-          <p:nvPr/>
-        </p:nvSpPr>
-        <p:spPr bwMode="auto">
-          <a:xfrm>
-            <a:off x="3558340" y="1021903"/>
-            <a:ext cx="1524000" cy="152400"/>
-          </a:xfrm>
-          <a:prstGeom prst="rect">
-            <a:avLst/>
-          </a:prstGeom>
-          <a:noFill/>
-          <a:ln>
-            <a:noFill/>
-          </a:ln>
-          <a:effectLst/>
-          <a:extLst>
-            <a:ext uri="{909E8E84-426E-40DD-AFC4-6F175D3DCCD1}">
-              <a14:hiddenFill xmlns:a14="http://schemas.microsoft.com/office/drawing/2010/main">
-                <a:solidFill>
-                  <a:schemeClr val="accent1"/>
-                </a:solidFill>
-              </a14:hiddenFill>
-            </a:ext>
-            <a:ext uri="{91240B29-F687-4F45-9708-019B960494DF}">
-              <a14:hiddenLine xmlns:a14="http://schemas.microsoft.com/office/drawing/2010/main" w="9525">
-                <a:solidFill>
-                  <a:schemeClr val="tx1"/>
-                </a:solidFill>
-                <a:miter lim="800000"/>
-                <a:headEnd/>
-                <a:tailEnd/>
-              </a14:hiddenLine>
-            </a:ext>
-            <a:ext uri="{AF507438-7753-43E0-B8FC-AC1667EBCBE1}">
-              <a14:hiddenEffects xmlns:a14="http://schemas.microsoft.com/office/drawing/2010/main">
-                <a:effectLst>
-                  <a:outerShdw dist="35921" dir="2700000" algn="ctr" rotWithShape="0">
-                    <a:schemeClr val="bg2"/>
-                  </a:outerShdw>
-                </a:effectLst>
-              </a14:hiddenEffects>
-            </a:ext>
-          </a:extLst>
-        </p:spPr>
-        <p:txBody>
-          <a:bodyPr lIns="0" tIns="0" rIns="0" bIns="0">
-            <a:spAutoFit/>
-          </a:bodyPr>
-          <a:lstStyle/>
-          <a:p>
-            <a:pPr>
-              <a:spcBef>
-                <a:spcPct val="50000"/>
-              </a:spcBef>
-            </a:pPr>
-            <a:r>
-              <a:rPr lang="en-US" altLang="en-US" sz="1000" i="1" dirty="0" smtClean="0">
-                <a:latin typeface="Tahoma" panose="020B0604030504040204" pitchFamily="34" charset="0"/>
-              </a:rPr>
-              <a:t>Tools</a:t>
-            </a:r>
-            <a:endParaRPr lang="en-US" altLang="en-US" sz="1000" i="1" dirty="0">
-              <a:latin typeface="Tahoma" panose="020B0604030504040204" pitchFamily="34" charset="0"/>
-            </a:endParaRPr>
-          </a:p>
-        </p:txBody>
-      </p:sp>
-      <p:sp>
-        <p:nvSpPr>
-          <p:cNvPr id="174" name="Text Box 56"/>
-          <p:cNvSpPr txBox="1">
-            <a:spLocks noChangeArrowheads="1"/>
-          </p:cNvSpPr>
-          <p:nvPr/>
-        </p:nvSpPr>
-        <p:spPr bwMode="auto">
-          <a:xfrm>
-            <a:off x="5989723" y="1040765"/>
-            <a:ext cx="1524000" cy="152400"/>
-          </a:xfrm>
-          <a:prstGeom prst="rect">
-            <a:avLst/>
-          </a:prstGeom>
-          <a:noFill/>
-          <a:ln>
-            <a:noFill/>
-          </a:ln>
-          <a:effectLst/>
-          <a:extLst>
-            <a:ext uri="{909E8E84-426E-40DD-AFC4-6F175D3DCCD1}">
-              <a14:hiddenFill xmlns:a14="http://schemas.microsoft.com/office/drawing/2010/main">
-                <a:solidFill>
-                  <a:schemeClr val="accent1"/>
-                </a:solidFill>
-              </a14:hiddenFill>
-            </a:ext>
-            <a:ext uri="{91240B29-F687-4F45-9708-019B960494DF}">
-              <a14:hiddenLine xmlns:a14="http://schemas.microsoft.com/office/drawing/2010/main" w="9525">
-                <a:solidFill>
-                  <a:schemeClr val="tx1"/>
-                </a:solidFill>
-                <a:miter lim="800000"/>
-                <a:headEnd/>
-                <a:tailEnd/>
-              </a14:hiddenLine>
-            </a:ext>
-            <a:ext uri="{AF507438-7753-43E0-B8FC-AC1667EBCBE1}">
-              <a14:hiddenEffects xmlns:a14="http://schemas.microsoft.com/office/drawing/2010/main">
-                <a:effectLst>
-                  <a:outerShdw dist="35921" dir="2700000" algn="ctr" rotWithShape="0">
-                    <a:schemeClr val="bg2"/>
-                  </a:outerShdw>
-                </a:effectLst>
-              </a14:hiddenEffects>
-            </a:ext>
-          </a:extLst>
-        </p:spPr>
-        <p:txBody>
-          <a:bodyPr lIns="0" tIns="0" rIns="0" bIns="0">
-            <a:spAutoFit/>
-          </a:bodyPr>
-          <a:lstStyle/>
-          <a:p>
-            <a:pPr>
-              <a:spcBef>
-                <a:spcPct val="50000"/>
-              </a:spcBef>
-            </a:pPr>
-            <a:r>
-              <a:rPr lang="en-US" altLang="en-US" sz="1000" i="1" dirty="0" err="1" smtClean="0">
-                <a:latin typeface="Tahoma" panose="020B0604030504040204" pitchFamily="34" charset="0"/>
-              </a:rPr>
-              <a:t>Objecten</a:t>
-            </a:r>
-            <a:endParaRPr lang="en-US" altLang="en-US" sz="1000" i="1" dirty="0">
-              <a:latin typeface="Tahoma" panose="020B0604030504040204" pitchFamily="34" charset="0"/>
-            </a:endParaRPr>
-          </a:p>
-        </p:txBody>
-      </p:sp>
-      <p:sp>
-        <p:nvSpPr>
-          <p:cNvPr id="71" name="Text Box 56"/>
-          <p:cNvSpPr txBox="1">
-            <a:spLocks noChangeArrowheads="1"/>
-          </p:cNvSpPr>
-          <p:nvPr/>
-        </p:nvSpPr>
-        <p:spPr bwMode="auto">
-          <a:xfrm>
-            <a:off x="2251397" y="1022091"/>
-            <a:ext cx="1181907" cy="153888"/>
-          </a:xfrm>
-          <a:prstGeom prst="rect">
-            <a:avLst/>
-          </a:prstGeom>
-          <a:noFill/>
-          <a:ln>
-            <a:noFill/>
-          </a:ln>
-          <a:effectLst/>
-          <a:extLst>
-            <a:ext uri="{909E8E84-426E-40DD-AFC4-6F175D3DCCD1}">
-              <a14:hiddenFill xmlns:a14="http://schemas.microsoft.com/office/drawing/2010/main">
-                <a:solidFill>
-                  <a:schemeClr val="accent1"/>
-                </a:solidFill>
-              </a14:hiddenFill>
-            </a:ext>
-            <a:ext uri="{91240B29-F687-4F45-9708-019B960494DF}">
-              <a14:hiddenLine xmlns:a14="http://schemas.microsoft.com/office/drawing/2010/main" w="9525">
-                <a:solidFill>
-                  <a:schemeClr val="tx1"/>
-                </a:solidFill>
-                <a:miter lim="800000"/>
-                <a:headEnd/>
-                <a:tailEnd/>
-              </a14:hiddenLine>
-            </a:ext>
-            <a:ext uri="{AF507438-7753-43E0-B8FC-AC1667EBCBE1}">
-              <a14:hiddenEffects xmlns:a14="http://schemas.microsoft.com/office/drawing/2010/main">
-                <a:effectLst>
-                  <a:outerShdw dist="35921" dir="2700000" algn="ctr" rotWithShape="0">
-                    <a:schemeClr val="bg2"/>
-                  </a:outerShdw>
-                </a:effectLst>
-              </a14:hiddenEffects>
-            </a:ext>
-          </a:extLst>
-        </p:spPr>
-        <p:txBody>
-          <a:bodyPr wrap="square" lIns="0" tIns="0" rIns="0" bIns="0">
-            <a:spAutoFit/>
-          </a:bodyPr>
-          <a:lstStyle/>
-          <a:p>
-            <a:pPr>
-              <a:spcBef>
-                <a:spcPct val="50000"/>
-              </a:spcBef>
-            </a:pPr>
-            <a:r>
-              <a:rPr lang="en-US" altLang="en-US" sz="1000" i="1" dirty="0" err="1" smtClean="0">
-                <a:latin typeface="Tahoma" panose="020B0604030504040204" pitchFamily="34" charset="0"/>
-              </a:rPr>
-              <a:t>SchetsPlus</a:t>
-            </a:r>
-            <a:endParaRPr lang="en-US" altLang="en-US" sz="1000" i="1" dirty="0">
               <a:latin typeface="Tahoma" panose="020B0604030504040204" pitchFamily="34" charset="0"/>
             </a:endParaRPr>
           </a:p>

</xml_diff>